<commit_message>
updates to current cluster
</commit_message>
<xml_diff>
--- a/cluster_course/powerpoint/2_Getting_connected.pptx
+++ b/cluster_course/powerpoint/2_Getting_connected.pptx
@@ -267,7 +267,7 @@
           <a:p>
             <a:fld id="{A533EB26-2E25-4466-BA1F-4ED20A958A47}" type="datetimeFigureOut">
               <a:rPr lang="en-GB" smtClean="0"/>
-              <a:t>23/11/2018</a:t>
+              <a:t>28/10/2019</a:t>
             </a:fld>
             <a:endParaRPr lang="en-GB"/>
           </a:p>
@@ -467,7 +467,7 @@
           <a:p>
             <a:fld id="{A533EB26-2E25-4466-BA1F-4ED20A958A47}" type="datetimeFigureOut">
               <a:rPr lang="en-GB" smtClean="0"/>
-              <a:t>23/11/2018</a:t>
+              <a:t>28/10/2019</a:t>
             </a:fld>
             <a:endParaRPr lang="en-GB"/>
           </a:p>
@@ -677,7 +677,7 @@
           <a:p>
             <a:fld id="{A533EB26-2E25-4466-BA1F-4ED20A958A47}" type="datetimeFigureOut">
               <a:rPr lang="en-GB" smtClean="0"/>
-              <a:t>23/11/2018</a:t>
+              <a:t>28/10/2019</a:t>
             </a:fld>
             <a:endParaRPr lang="en-GB"/>
           </a:p>
@@ -877,7 +877,7 @@
           <a:p>
             <a:fld id="{A533EB26-2E25-4466-BA1F-4ED20A958A47}" type="datetimeFigureOut">
               <a:rPr lang="en-GB" smtClean="0"/>
-              <a:t>23/11/2018</a:t>
+              <a:t>28/10/2019</a:t>
             </a:fld>
             <a:endParaRPr lang="en-GB"/>
           </a:p>
@@ -1153,7 +1153,7 @@
           <a:p>
             <a:fld id="{A533EB26-2E25-4466-BA1F-4ED20A958A47}" type="datetimeFigureOut">
               <a:rPr lang="en-GB" smtClean="0"/>
-              <a:t>23/11/2018</a:t>
+              <a:t>28/10/2019</a:t>
             </a:fld>
             <a:endParaRPr lang="en-GB"/>
           </a:p>
@@ -1421,7 +1421,7 @@
           <a:p>
             <a:fld id="{A533EB26-2E25-4466-BA1F-4ED20A958A47}" type="datetimeFigureOut">
               <a:rPr lang="en-GB" smtClean="0"/>
-              <a:t>23/11/2018</a:t>
+              <a:t>28/10/2019</a:t>
             </a:fld>
             <a:endParaRPr lang="en-GB"/>
           </a:p>
@@ -1836,7 +1836,7 @@
           <a:p>
             <a:fld id="{A533EB26-2E25-4466-BA1F-4ED20A958A47}" type="datetimeFigureOut">
               <a:rPr lang="en-GB" smtClean="0"/>
-              <a:t>23/11/2018</a:t>
+              <a:t>28/10/2019</a:t>
             </a:fld>
             <a:endParaRPr lang="en-GB"/>
           </a:p>
@@ -1978,7 +1978,7 @@
           <a:p>
             <a:fld id="{A533EB26-2E25-4466-BA1F-4ED20A958A47}" type="datetimeFigureOut">
               <a:rPr lang="en-GB" smtClean="0"/>
-              <a:t>23/11/2018</a:t>
+              <a:t>28/10/2019</a:t>
             </a:fld>
             <a:endParaRPr lang="en-GB"/>
           </a:p>
@@ -2091,7 +2091,7 @@
           <a:p>
             <a:fld id="{A533EB26-2E25-4466-BA1F-4ED20A958A47}" type="datetimeFigureOut">
               <a:rPr lang="en-GB" smtClean="0"/>
-              <a:t>23/11/2018</a:t>
+              <a:t>28/10/2019</a:t>
             </a:fld>
             <a:endParaRPr lang="en-GB"/>
           </a:p>
@@ -2404,7 +2404,7 @@
           <a:p>
             <a:fld id="{A533EB26-2E25-4466-BA1F-4ED20A958A47}" type="datetimeFigureOut">
               <a:rPr lang="en-GB" smtClean="0"/>
-              <a:t>23/11/2018</a:t>
+              <a:t>28/10/2019</a:t>
             </a:fld>
             <a:endParaRPr lang="en-GB"/>
           </a:p>
@@ -2693,7 +2693,7 @@
           <a:p>
             <a:fld id="{A533EB26-2E25-4466-BA1F-4ED20A958A47}" type="datetimeFigureOut">
               <a:rPr lang="en-GB" smtClean="0"/>
-              <a:t>23/11/2018</a:t>
+              <a:t>28/10/2019</a:t>
             </a:fld>
             <a:endParaRPr lang="en-GB"/>
           </a:p>
@@ -2936,7 +2936,7 @@
           <a:p>
             <a:fld id="{A533EB26-2E25-4466-BA1F-4ED20A958A47}" type="datetimeFigureOut">
               <a:rPr lang="en-GB" smtClean="0"/>
-              <a:t>23/11/2018</a:t>
+              <a:t>28/10/2019</a:t>
             </a:fld>
             <a:endParaRPr lang="en-GB"/>
           </a:p>
@@ -3415,7 +3415,7 @@
         </p:spPr>
         <p:txBody>
           <a:bodyPr>
-            <a:normAutofit fontScale="77500" lnSpcReduction="20000"/>
+            <a:normAutofit fontScale="92500" lnSpcReduction="20000"/>
           </a:bodyPr>
           <a:lstStyle/>
           <a:p>
@@ -3471,7 +3471,7 @@
               <a:t>	</a:t>
             </a:r>
             <a:r>
-              <a:rPr lang="en-GB" dirty="0" err="1"/>
+              <a:rPr lang="en-GB" b="1" dirty="0" err="1"/>
               <a:t>Mobaxterm</a:t>
             </a:r>
             <a:r>
@@ -3537,7 +3537,7 @@
           <a:p>
             <a:r>
               <a:rPr lang="en-GB" dirty="0"/>
-              <a:t>Mac: </a:t>
+              <a:t>Mac/ Linux: </a:t>
             </a:r>
           </a:p>
           <a:p>
@@ -3573,7 +3573,30 @@
             </a:pPr>
             <a:r>
               <a:rPr lang="en-GB" dirty="0"/>
-              <a:t>	samba</a:t>
+              <a:t>	samba </a:t>
+            </a:r>
+            <a:r>
+              <a:rPr lang="en-GB" sz="1900" dirty="0"/>
+              <a:t>(</a:t>
+            </a:r>
+            <a:r>
+              <a:rPr lang="en-GB" sz="1900" dirty="0">
+                <a:hlinkClick r:id="rId6"/>
+              </a:rPr>
+              <a:t>http://stab.st-andrews.ac.uk/wiki/index.php/Mounting_marvin_remotely</a:t>
+            </a:r>
+            <a:r>
+              <a:rPr lang="en-GB" sz="1900" dirty="0"/>
+              <a:t>)</a:t>
+            </a:r>
+          </a:p>
+          <a:p>
+            <a:pPr marL="0" indent="0">
+              <a:buNone/>
+            </a:pPr>
+            <a:r>
+              <a:rPr lang="en-GB" dirty="0"/>
+              <a:t>	command line Linux:</a:t>
             </a:r>
           </a:p>
           <a:p>
@@ -3584,23 +3607,10 @@
               <a:rPr lang="en-GB" dirty="0"/>
               <a:t>	command line</a:t>
             </a:r>
-          </a:p>
-          <a:p>
-            <a:r>
-              <a:rPr lang="en-GB" dirty="0"/>
-              <a:t>Linux:</a:t>
-            </a:r>
-          </a:p>
-          <a:p>
-            <a:pPr marL="0" indent="0">
-              <a:buNone/>
-            </a:pPr>
-            <a:r>
-              <a:rPr lang="en-GB" dirty="0"/>
-              <a:t>	command line</a:t>
-            </a:r>
-          </a:p>
-          <a:p>
+            <a:r>
+              <a:rPr lang="en-GB" sz="1900" dirty="0"/>
+              <a:t>  </a:t>
+            </a:r>
             <a:endParaRPr lang="en-GB" dirty="0"/>
           </a:p>
           <a:p>
@@ -3634,7 +3644,7 @@
           <p:nvPr/>
         </p:nvPicPr>
         <p:blipFill>
-          <a:blip r:embed="rId6">
+          <a:blip r:embed="rId7">
             <a:extLst>
               <a:ext uri="{28A0092B-C50C-407E-A947-70E740481C1C}">
                 <a14:useLocalDpi xmlns:a14="http://schemas.microsoft.com/office/drawing/2010/main" val="0"/>
@@ -3647,8 +3657,8 @@
         </p:blipFill>
         <p:spPr>
           <a:xfrm>
-            <a:off x="7713399" y="1447661"/>
-            <a:ext cx="4346825" cy="3200677"/>
+            <a:off x="8294790" y="1609994"/>
+            <a:ext cx="3592417" cy="2645187"/>
           </a:xfrm>
           <a:prstGeom prst="rect">
             <a:avLst/>
@@ -3712,8 +3722,8 @@
         </p:blipFill>
         <p:spPr>
           <a:xfrm>
-            <a:off x="533401" y="1654391"/>
-            <a:ext cx="3292641" cy="4664041"/>
+            <a:off x="533401" y="1097659"/>
+            <a:ext cx="3685673" cy="5220773"/>
           </a:xfrm>
           <a:prstGeom prst="rect">
             <a:avLst/>
@@ -3814,7 +3824,7 @@
         </p:nvCxnSpPr>
         <p:spPr>
           <a:xfrm flipH="1" flipV="1">
-            <a:off x="3048000" y="5831305"/>
+            <a:off x="3364831" y="5739003"/>
             <a:ext cx="1042737" cy="208548"/>
           </a:xfrm>
           <a:prstGeom prst="straightConnector1">
@@ -3853,7 +3863,7 @@
         </p:nvCxnSpPr>
         <p:spPr>
           <a:xfrm flipH="1" flipV="1">
-            <a:off x="3344779" y="1828800"/>
+            <a:off x="3569368" y="1318180"/>
             <a:ext cx="874295" cy="104274"/>
           </a:xfrm>
           <a:prstGeom prst="straightConnector1">
@@ -3966,7 +3976,7 @@
         </p:nvSpPr>
         <p:spPr>
           <a:xfrm>
-            <a:off x="4146884" y="1748408"/>
+            <a:off x="4537910" y="1285059"/>
             <a:ext cx="561474" cy="369332"/>
           </a:xfrm>
           <a:prstGeom prst="rect">
@@ -4001,7 +4011,7 @@
         </p:nvSpPr>
         <p:spPr>
           <a:xfrm>
-            <a:off x="4090737" y="5855187"/>
+            <a:off x="4220495" y="5873809"/>
             <a:ext cx="561474" cy="369332"/>
           </a:xfrm>
           <a:prstGeom prst="rect">
@@ -4595,7 +4605,7 @@
           <a:p>
             <a:r>
               <a:rPr lang="en-US" dirty="0"/>
-              <a:t>We are going to down load the PowerPoint and pdf files to your current computer desktop. </a:t>
+              <a:t>We are going to download the PowerPoint and pdf files to your current computer desktop. </a:t>
             </a:r>
           </a:p>
           <a:p>
@@ -4670,10 +4680,18 @@
                   <a:srgbClr val="7030A0"/>
                 </a:solidFill>
               </a:rPr>
-              <a:t>2) Getting connected: Download the </a:t>
-            </a:r>
-            <a:r>
-              <a:rPr lang="en-GB" i="1" dirty="0" err="1">
+              <a:t>2) </a:t>
+            </a:r>
+            <a:r>
+              <a:rPr lang="en-GB" sz="4000" dirty="0">
+                <a:solidFill>
+                  <a:srgbClr val="7030A0"/>
+                </a:solidFill>
+              </a:rPr>
+              <a:t>Getting connected: Download the </a:t>
+            </a:r>
+            <a:r>
+              <a:rPr lang="en-GB" sz="4000" i="1" dirty="0" err="1">
                 <a:solidFill>
                   <a:srgbClr val="7030A0"/>
                 </a:solidFill>
@@ -4681,7 +4699,7 @@
               <a:t>powerpoint</a:t>
             </a:r>
             <a:r>
-              <a:rPr lang="en-GB" dirty="0">
+              <a:rPr lang="en-GB" sz="4000" dirty="0">
                 <a:solidFill>
                   <a:srgbClr val="7030A0"/>
                 </a:solidFill>
@@ -4689,13 +4707,18 @@
               <a:t> presentation (* is a wild card for all): </a:t>
             </a:r>
             <a:r>
-              <a:rPr lang="en-GB" u="sng" dirty="0">
+              <a:rPr lang="en-GB" sz="4000" u="sng" dirty="0">
                 <a:solidFill>
                   <a:srgbClr val="7030A0"/>
                 </a:solidFill>
               </a:rPr>
-              <a:t>From a host terminal non logged onto Marvin</a:t>
-            </a:r>
+              <a:t>From a host terminal, not logged onto Marvin</a:t>
+            </a:r>
+            <a:endParaRPr lang="en-GB" u="sng" dirty="0">
+              <a:solidFill>
+                <a:srgbClr val="7030A0"/>
+              </a:solidFill>
+            </a:endParaRPr>
           </a:p>
         </p:txBody>
       </p:sp>
@@ -4776,10 +4799,18 @@
                   <a:srgbClr val="0070C0"/>
                 </a:solidFill>
               </a:rPr>
-              <a:t>/*.pptx  /Users/</a:t>
-            </a:r>
-            <a:r>
-              <a:rPr lang="en-GB" i="1" dirty="0">
+              <a:t>/*.pptx  </a:t>
+            </a:r>
+            <a:r>
+              <a:rPr lang="en-GB">
+                <a:solidFill>
+                  <a:srgbClr val="0070C0"/>
+                </a:solidFill>
+              </a:rPr>
+              <a:t>/Users/</a:t>
+            </a:r>
+            <a:r>
+              <a:rPr lang="en-GB" i="1">
                 <a:solidFill>
                   <a:srgbClr val="FF0000"/>
                 </a:solidFill>
@@ -4869,7 +4900,7 @@
                   <a:srgbClr val="FF0000"/>
                 </a:solidFill>
               </a:rPr>
-              <a:t> username </a:t>
+              <a:t>username</a:t>
             </a:r>
             <a:r>
               <a:rPr lang="en-GB" dirty="0">
@@ -4935,7 +4966,7 @@
                   <a:srgbClr val="FF0000"/>
                 </a:solidFill>
               </a:rPr>
-              <a:t> username </a:t>
+              <a:t>username</a:t>
             </a:r>
             <a:r>
               <a:rPr lang="en-GB" sz="2400" dirty="0">

</xml_diff>